<commit_message>
Presentation done + export to pdf
</commit_message>
<xml_diff>
--- a/MasterThesisPresentation.pptx
+++ b/MasterThesisPresentation.pptx
@@ -17,6 +17,13 @@
     <p:sldId id="266" r:id="rId11"/>
     <p:sldId id="267" r:id="rId12"/>
     <p:sldId id="268" r:id="rId13"/>
+    <p:sldId id="269" r:id="rId14"/>
+    <p:sldId id="271" r:id="rId15"/>
+    <p:sldId id="270" r:id="rId16"/>
+    <p:sldId id="272" r:id="rId17"/>
+    <p:sldId id="275" r:id="rId18"/>
+    <p:sldId id="273" r:id="rId19"/>
+    <p:sldId id="274" r:id="rId20"/>
   </p:sldIdLst>
   <p:sldSz cx="12192000" cy="6858000"/>
   <p:notesSz cx="6858000" cy="9144000"/>
@@ -8446,6 +8453,2141 @@
 </p:sld>
 </file>
 
+<file path=ppt/slides/slide13.xml><?xml version="1.0" encoding="utf-8"?>
+<p:sld xmlns:a="http://schemas.openxmlformats.org/drawingml/2006/main" xmlns:r="http://schemas.openxmlformats.org/officeDocument/2006/relationships" xmlns:p="http://schemas.openxmlformats.org/presentationml/2006/main">
+  <p:cSld>
+    <p:bg>
+      <p:bgPr>
+        <a:solidFill>
+          <a:srgbClr val="1D1A1D"/>
+        </a:solidFill>
+        <a:effectLst/>
+      </p:bgPr>
+    </p:bg>
+    <p:spTree>
+      <p:nvGrpSpPr>
+        <p:cNvPr id="1" name=""/>
+        <p:cNvGrpSpPr/>
+        <p:nvPr/>
+      </p:nvGrpSpPr>
+      <p:grpSpPr>
+        <a:xfrm>
+          <a:off x="0" y="0"/>
+          <a:ext cx="0" cy="0"/>
+          <a:chOff x="0" y="0"/>
+          <a:chExt cx="0" cy="0"/>
+        </a:xfrm>
+      </p:grpSpPr>
+      <p:sp>
+        <p:nvSpPr>
+          <p:cNvPr id="15" name="Text Placeholder 6">
+            <a:extLst>
+              <a:ext uri="{FF2B5EF4-FFF2-40B4-BE49-F238E27FC236}">
+                <a16:creationId xmlns:a16="http://schemas.microsoft.com/office/drawing/2014/main" id="{5D2BAA3B-7146-4312-B82E-7B1A8C915C02}"/>
+              </a:ext>
+            </a:extLst>
+          </p:cNvPr>
+          <p:cNvSpPr txBox="1">
+            <a:spLocks/>
+          </p:cNvSpPr>
+          <p:nvPr/>
+        </p:nvSpPr>
+        <p:spPr>
+          <a:xfrm>
+            <a:off x="1947673" y="273160"/>
+            <a:ext cx="8401429" cy="819150"/>
+          </a:xfrm>
+          <a:prstGeom prst="rect">
+            <a:avLst/>
+          </a:prstGeom>
+        </p:spPr>
+        <p:txBody>
+          <a:bodyPr vert="horz" lIns="91440" tIns="45720" rIns="91440" bIns="45720" rtlCol="0" anchor="b">
+            <a:normAutofit/>
+          </a:bodyPr>
+          <a:lstStyle>
+            <a:lvl1pPr marL="0" indent="0" algn="l" defTabSz="914400" rtl="0" eaLnBrk="1" latinLnBrk="0" hangingPunct="1">
+              <a:lnSpc>
+                <a:spcPct val="113000"/>
+              </a:lnSpc>
+              <a:spcBef>
+                <a:spcPts val="0"/>
+              </a:spcBef>
+              <a:buFont typeface="Arial" panose="020B0604020202020204" pitchFamily="34" charset="0"/>
+              <a:buNone/>
+              <a:defRPr sz="2400" b="0" i="1" kern="1200" baseline="0">
+                <a:solidFill>
+                  <a:schemeClr val="tx1">
+                    <a:lumMod val="85000"/>
+                    <a:lumOff val="15000"/>
+                  </a:schemeClr>
+                </a:solidFill>
+                <a:latin typeface="+mn-lt"/>
+                <a:ea typeface="+mn-ea"/>
+                <a:cs typeface="+mn-cs"/>
+              </a:defRPr>
+            </a:lvl1pPr>
+            <a:lvl2pPr marL="457200" indent="0" algn="l" defTabSz="914400" rtl="0" eaLnBrk="1" latinLnBrk="0" hangingPunct="1">
+              <a:lnSpc>
+                <a:spcPct val="112000"/>
+              </a:lnSpc>
+              <a:spcBef>
+                <a:spcPts val="900"/>
+              </a:spcBef>
+              <a:buFont typeface="Corbel" panose="020B0503020204020204" pitchFamily="34" charset="0"/>
+              <a:buNone/>
+              <a:defRPr sz="2000" b="1" kern="1200" baseline="0">
+                <a:solidFill>
+                  <a:schemeClr val="tx1">
+                    <a:lumMod val="85000"/>
+                    <a:lumOff val="15000"/>
+                  </a:schemeClr>
+                </a:solidFill>
+                <a:latin typeface="+mn-lt"/>
+                <a:ea typeface="+mn-ea"/>
+                <a:cs typeface="+mn-cs"/>
+              </a:defRPr>
+            </a:lvl2pPr>
+            <a:lvl3pPr marL="914400" indent="0" algn="l" defTabSz="914400" rtl="0" eaLnBrk="1" latinLnBrk="0" hangingPunct="1">
+              <a:lnSpc>
+                <a:spcPct val="112000"/>
+              </a:lnSpc>
+              <a:spcBef>
+                <a:spcPts val="900"/>
+              </a:spcBef>
+              <a:buFont typeface="Arial" panose="020B0604020202020204" pitchFamily="34" charset="0"/>
+              <a:buNone/>
+              <a:defRPr sz="1800" b="1" kern="1200" baseline="0">
+                <a:solidFill>
+                  <a:schemeClr val="tx1">
+                    <a:lumMod val="85000"/>
+                    <a:lumOff val="15000"/>
+                  </a:schemeClr>
+                </a:solidFill>
+                <a:latin typeface="+mn-lt"/>
+                <a:ea typeface="+mn-ea"/>
+                <a:cs typeface="+mn-cs"/>
+              </a:defRPr>
+            </a:lvl3pPr>
+            <a:lvl4pPr marL="1371600" indent="0" algn="l" defTabSz="914400" rtl="0" eaLnBrk="1" latinLnBrk="0" hangingPunct="1">
+              <a:lnSpc>
+                <a:spcPct val="112000"/>
+              </a:lnSpc>
+              <a:spcBef>
+                <a:spcPts val="900"/>
+              </a:spcBef>
+              <a:buFont typeface="Corbel" panose="020B0503020204020204" pitchFamily="34" charset="0"/>
+              <a:buNone/>
+              <a:defRPr sz="1600" b="1" kern="1200" baseline="0">
+                <a:solidFill>
+                  <a:schemeClr val="tx1">
+                    <a:lumMod val="85000"/>
+                    <a:lumOff val="15000"/>
+                  </a:schemeClr>
+                </a:solidFill>
+                <a:latin typeface="+mn-lt"/>
+                <a:ea typeface="+mn-ea"/>
+                <a:cs typeface="+mn-cs"/>
+              </a:defRPr>
+            </a:lvl4pPr>
+            <a:lvl5pPr marL="1828800" indent="0" algn="l" defTabSz="914400" rtl="0" eaLnBrk="1" latinLnBrk="0" hangingPunct="1">
+              <a:lnSpc>
+                <a:spcPct val="112000"/>
+              </a:lnSpc>
+              <a:spcBef>
+                <a:spcPts val="900"/>
+              </a:spcBef>
+              <a:buFont typeface="Arial" panose="020B0604020202020204" pitchFamily="34" charset="0"/>
+              <a:buNone/>
+              <a:defRPr sz="1600" b="1" i="1" kern="1200" baseline="0">
+                <a:solidFill>
+                  <a:schemeClr val="tx1">
+                    <a:lumMod val="85000"/>
+                    <a:lumOff val="15000"/>
+                  </a:schemeClr>
+                </a:solidFill>
+                <a:latin typeface="+mn-lt"/>
+                <a:ea typeface="+mn-ea"/>
+                <a:cs typeface="+mn-cs"/>
+              </a:defRPr>
+            </a:lvl5pPr>
+            <a:lvl6pPr marL="2286000" indent="0" algn="l" defTabSz="914400" rtl="0" eaLnBrk="1" latinLnBrk="0" hangingPunct="1">
+              <a:lnSpc>
+                <a:spcPct val="112000"/>
+              </a:lnSpc>
+              <a:spcBef>
+                <a:spcPts val="1300"/>
+              </a:spcBef>
+              <a:buFont typeface="Corbel" panose="020B0503020204020204" pitchFamily="34" charset="0"/>
+              <a:buNone/>
+              <a:defRPr sz="1600" b="1" kern="1200">
+                <a:solidFill>
+                  <a:schemeClr val="tx1">
+                    <a:lumMod val="85000"/>
+                    <a:lumOff val="15000"/>
+                  </a:schemeClr>
+                </a:solidFill>
+                <a:latin typeface="+mn-lt"/>
+                <a:ea typeface="+mn-ea"/>
+                <a:cs typeface="+mn-cs"/>
+              </a:defRPr>
+            </a:lvl6pPr>
+            <a:lvl7pPr marL="2743200" indent="0" algn="l" defTabSz="914400" rtl="0" eaLnBrk="1" latinLnBrk="0" hangingPunct="1">
+              <a:lnSpc>
+                <a:spcPct val="112000"/>
+              </a:lnSpc>
+              <a:spcBef>
+                <a:spcPts val="1300"/>
+              </a:spcBef>
+              <a:buFont typeface="Arial" panose="020B0604020202020204" pitchFamily="34" charset="0"/>
+              <a:buNone/>
+              <a:defRPr sz="1600" b="1" i="1" kern="1200">
+                <a:solidFill>
+                  <a:schemeClr val="tx1">
+                    <a:lumMod val="85000"/>
+                    <a:lumOff val="15000"/>
+                  </a:schemeClr>
+                </a:solidFill>
+                <a:latin typeface="+mn-lt"/>
+                <a:ea typeface="+mn-ea"/>
+                <a:cs typeface="+mn-cs"/>
+              </a:defRPr>
+            </a:lvl7pPr>
+            <a:lvl8pPr marL="3200400" indent="0" algn="l" defTabSz="914400" rtl="0" eaLnBrk="1" latinLnBrk="0" hangingPunct="1">
+              <a:lnSpc>
+                <a:spcPct val="112000"/>
+              </a:lnSpc>
+              <a:spcBef>
+                <a:spcPts val="1300"/>
+              </a:spcBef>
+              <a:buFont typeface="Corbel" panose="020B0503020204020204" pitchFamily="34" charset="0"/>
+              <a:buNone/>
+              <a:defRPr sz="1600" b="1" kern="1200">
+                <a:solidFill>
+                  <a:schemeClr val="tx1">
+                    <a:lumMod val="85000"/>
+                    <a:lumOff val="15000"/>
+                  </a:schemeClr>
+                </a:solidFill>
+                <a:latin typeface="+mn-lt"/>
+                <a:ea typeface="+mn-ea"/>
+                <a:cs typeface="+mn-cs"/>
+              </a:defRPr>
+            </a:lvl8pPr>
+            <a:lvl9pPr marL="3657600" indent="0" algn="l" defTabSz="914400" rtl="0" eaLnBrk="1" latinLnBrk="0" hangingPunct="1">
+              <a:lnSpc>
+                <a:spcPct val="112000"/>
+              </a:lnSpc>
+              <a:spcBef>
+                <a:spcPts val="1300"/>
+              </a:spcBef>
+              <a:buFont typeface="Arial" panose="020B0604020202020204" pitchFamily="34" charset="0"/>
+              <a:buNone/>
+              <a:defRPr sz="1600" b="1" i="1" kern="1200" baseline="0">
+                <a:solidFill>
+                  <a:schemeClr val="tx1">
+                    <a:lumMod val="85000"/>
+                    <a:lumOff val="15000"/>
+                  </a:schemeClr>
+                </a:solidFill>
+                <a:latin typeface="+mn-lt"/>
+                <a:ea typeface="+mn-ea"/>
+                <a:cs typeface="+mn-cs"/>
+              </a:defRPr>
+            </a:lvl9pPr>
+          </a:lstStyle>
+          <a:p>
+            <a:r>
+              <a:rPr lang="pl-PL" dirty="0">
+                <a:solidFill>
+                  <a:schemeClr val="bg1"/>
+                </a:solidFill>
+                <a:latin typeface="Georgia" panose="02040502050405020303" pitchFamily="18" charset="0"/>
+              </a:rPr>
+              <a:t>Main Theorem</a:t>
+            </a:r>
+          </a:p>
+        </p:txBody>
+      </p:sp>
+      <p:pic>
+        <p:nvPicPr>
+          <p:cNvPr id="4" name="Picture 3">
+            <a:extLst>
+              <a:ext uri="{FF2B5EF4-FFF2-40B4-BE49-F238E27FC236}">
+                <a16:creationId xmlns:a16="http://schemas.microsoft.com/office/drawing/2014/main" id="{966AB6AD-BB31-4B77-9183-FBC35B096868}"/>
+              </a:ext>
+            </a:extLst>
+          </p:cNvPr>
+          <p:cNvPicPr>
+            <a:picLocks noChangeAspect="1"/>
+          </p:cNvPicPr>
+          <p:nvPr/>
+        </p:nvPicPr>
+        <p:blipFill>
+          <a:blip r:embed="rId2">
+            <a:extLst>
+              <a:ext uri="{28A0092B-C50C-407E-A947-70E740481C1C}">
+                <a14:useLocalDpi xmlns:a14="http://schemas.microsoft.com/office/drawing/2010/main" val="0"/>
+              </a:ext>
+            </a:extLst>
+          </a:blip>
+          <a:stretch>
+            <a:fillRect/>
+          </a:stretch>
+        </p:blipFill>
+        <p:spPr>
+          <a:xfrm>
+            <a:off x="1401377" y="1297421"/>
+            <a:ext cx="8742168" cy="4263157"/>
+          </a:xfrm>
+          <a:prstGeom prst="rect">
+            <a:avLst/>
+          </a:prstGeom>
+        </p:spPr>
+      </p:pic>
+    </p:spTree>
+    <p:extLst>
+      <p:ext uri="{BB962C8B-B14F-4D97-AF65-F5344CB8AC3E}">
+        <p14:creationId xmlns:p14="http://schemas.microsoft.com/office/powerpoint/2010/main" val="2517651291"/>
+      </p:ext>
+    </p:extLst>
+  </p:cSld>
+  <p:clrMapOvr>
+    <a:masterClrMapping/>
+  </p:clrMapOvr>
+</p:sld>
+</file>
+
+<file path=ppt/slides/slide14.xml><?xml version="1.0" encoding="utf-8"?>
+<p:sld xmlns:a="http://schemas.openxmlformats.org/drawingml/2006/main" xmlns:r="http://schemas.openxmlformats.org/officeDocument/2006/relationships" xmlns:p="http://schemas.openxmlformats.org/presentationml/2006/main">
+  <p:cSld>
+    <p:bg>
+      <p:bgPr>
+        <a:solidFill>
+          <a:srgbClr val="1D1A1D"/>
+        </a:solidFill>
+        <a:effectLst/>
+      </p:bgPr>
+    </p:bg>
+    <p:spTree>
+      <p:nvGrpSpPr>
+        <p:cNvPr id="1" name=""/>
+        <p:cNvGrpSpPr/>
+        <p:nvPr/>
+      </p:nvGrpSpPr>
+      <p:grpSpPr>
+        <a:xfrm>
+          <a:off x="0" y="0"/>
+          <a:ext cx="0" cy="0"/>
+          <a:chOff x="0" y="0"/>
+          <a:chExt cx="0" cy="0"/>
+        </a:xfrm>
+      </p:grpSpPr>
+      <p:sp>
+        <p:nvSpPr>
+          <p:cNvPr id="15" name="Text Placeholder 6">
+            <a:extLst>
+              <a:ext uri="{FF2B5EF4-FFF2-40B4-BE49-F238E27FC236}">
+                <a16:creationId xmlns:a16="http://schemas.microsoft.com/office/drawing/2014/main" id="{5D2BAA3B-7146-4312-B82E-7B1A8C915C02}"/>
+              </a:ext>
+            </a:extLst>
+          </p:cNvPr>
+          <p:cNvSpPr txBox="1">
+            <a:spLocks/>
+          </p:cNvSpPr>
+          <p:nvPr/>
+        </p:nvSpPr>
+        <p:spPr>
+          <a:xfrm>
+            <a:off x="1947673" y="273160"/>
+            <a:ext cx="8401429" cy="819150"/>
+          </a:xfrm>
+          <a:prstGeom prst="rect">
+            <a:avLst/>
+          </a:prstGeom>
+        </p:spPr>
+        <p:txBody>
+          <a:bodyPr vert="horz" lIns="91440" tIns="45720" rIns="91440" bIns="45720" rtlCol="0" anchor="b">
+            <a:normAutofit/>
+          </a:bodyPr>
+          <a:lstStyle>
+            <a:lvl1pPr marL="0" indent="0" algn="l" defTabSz="914400" rtl="0" eaLnBrk="1" latinLnBrk="0" hangingPunct="1">
+              <a:lnSpc>
+                <a:spcPct val="113000"/>
+              </a:lnSpc>
+              <a:spcBef>
+                <a:spcPts val="0"/>
+              </a:spcBef>
+              <a:buFont typeface="Arial" panose="020B0604020202020204" pitchFamily="34" charset="0"/>
+              <a:buNone/>
+              <a:defRPr sz="2400" b="0" i="1" kern="1200" baseline="0">
+                <a:solidFill>
+                  <a:schemeClr val="tx1">
+                    <a:lumMod val="85000"/>
+                    <a:lumOff val="15000"/>
+                  </a:schemeClr>
+                </a:solidFill>
+                <a:latin typeface="+mn-lt"/>
+                <a:ea typeface="+mn-ea"/>
+                <a:cs typeface="+mn-cs"/>
+              </a:defRPr>
+            </a:lvl1pPr>
+            <a:lvl2pPr marL="457200" indent="0" algn="l" defTabSz="914400" rtl="0" eaLnBrk="1" latinLnBrk="0" hangingPunct="1">
+              <a:lnSpc>
+                <a:spcPct val="112000"/>
+              </a:lnSpc>
+              <a:spcBef>
+                <a:spcPts val="900"/>
+              </a:spcBef>
+              <a:buFont typeface="Corbel" panose="020B0503020204020204" pitchFamily="34" charset="0"/>
+              <a:buNone/>
+              <a:defRPr sz="2000" b="1" kern="1200" baseline="0">
+                <a:solidFill>
+                  <a:schemeClr val="tx1">
+                    <a:lumMod val="85000"/>
+                    <a:lumOff val="15000"/>
+                  </a:schemeClr>
+                </a:solidFill>
+                <a:latin typeface="+mn-lt"/>
+                <a:ea typeface="+mn-ea"/>
+                <a:cs typeface="+mn-cs"/>
+              </a:defRPr>
+            </a:lvl2pPr>
+            <a:lvl3pPr marL="914400" indent="0" algn="l" defTabSz="914400" rtl="0" eaLnBrk="1" latinLnBrk="0" hangingPunct="1">
+              <a:lnSpc>
+                <a:spcPct val="112000"/>
+              </a:lnSpc>
+              <a:spcBef>
+                <a:spcPts val="900"/>
+              </a:spcBef>
+              <a:buFont typeface="Arial" panose="020B0604020202020204" pitchFamily="34" charset="0"/>
+              <a:buNone/>
+              <a:defRPr sz="1800" b="1" kern="1200" baseline="0">
+                <a:solidFill>
+                  <a:schemeClr val="tx1">
+                    <a:lumMod val="85000"/>
+                    <a:lumOff val="15000"/>
+                  </a:schemeClr>
+                </a:solidFill>
+                <a:latin typeface="+mn-lt"/>
+                <a:ea typeface="+mn-ea"/>
+                <a:cs typeface="+mn-cs"/>
+              </a:defRPr>
+            </a:lvl3pPr>
+            <a:lvl4pPr marL="1371600" indent="0" algn="l" defTabSz="914400" rtl="0" eaLnBrk="1" latinLnBrk="0" hangingPunct="1">
+              <a:lnSpc>
+                <a:spcPct val="112000"/>
+              </a:lnSpc>
+              <a:spcBef>
+                <a:spcPts val="900"/>
+              </a:spcBef>
+              <a:buFont typeface="Corbel" panose="020B0503020204020204" pitchFamily="34" charset="0"/>
+              <a:buNone/>
+              <a:defRPr sz="1600" b="1" kern="1200" baseline="0">
+                <a:solidFill>
+                  <a:schemeClr val="tx1">
+                    <a:lumMod val="85000"/>
+                    <a:lumOff val="15000"/>
+                  </a:schemeClr>
+                </a:solidFill>
+                <a:latin typeface="+mn-lt"/>
+                <a:ea typeface="+mn-ea"/>
+                <a:cs typeface="+mn-cs"/>
+              </a:defRPr>
+            </a:lvl4pPr>
+            <a:lvl5pPr marL="1828800" indent="0" algn="l" defTabSz="914400" rtl="0" eaLnBrk="1" latinLnBrk="0" hangingPunct="1">
+              <a:lnSpc>
+                <a:spcPct val="112000"/>
+              </a:lnSpc>
+              <a:spcBef>
+                <a:spcPts val="900"/>
+              </a:spcBef>
+              <a:buFont typeface="Arial" panose="020B0604020202020204" pitchFamily="34" charset="0"/>
+              <a:buNone/>
+              <a:defRPr sz="1600" b="1" i="1" kern="1200" baseline="0">
+                <a:solidFill>
+                  <a:schemeClr val="tx1">
+                    <a:lumMod val="85000"/>
+                    <a:lumOff val="15000"/>
+                  </a:schemeClr>
+                </a:solidFill>
+                <a:latin typeface="+mn-lt"/>
+                <a:ea typeface="+mn-ea"/>
+                <a:cs typeface="+mn-cs"/>
+              </a:defRPr>
+            </a:lvl5pPr>
+            <a:lvl6pPr marL="2286000" indent="0" algn="l" defTabSz="914400" rtl="0" eaLnBrk="1" latinLnBrk="0" hangingPunct="1">
+              <a:lnSpc>
+                <a:spcPct val="112000"/>
+              </a:lnSpc>
+              <a:spcBef>
+                <a:spcPts val="1300"/>
+              </a:spcBef>
+              <a:buFont typeface="Corbel" panose="020B0503020204020204" pitchFamily="34" charset="0"/>
+              <a:buNone/>
+              <a:defRPr sz="1600" b="1" kern="1200">
+                <a:solidFill>
+                  <a:schemeClr val="tx1">
+                    <a:lumMod val="85000"/>
+                    <a:lumOff val="15000"/>
+                  </a:schemeClr>
+                </a:solidFill>
+                <a:latin typeface="+mn-lt"/>
+                <a:ea typeface="+mn-ea"/>
+                <a:cs typeface="+mn-cs"/>
+              </a:defRPr>
+            </a:lvl6pPr>
+            <a:lvl7pPr marL="2743200" indent="0" algn="l" defTabSz="914400" rtl="0" eaLnBrk="1" latinLnBrk="0" hangingPunct="1">
+              <a:lnSpc>
+                <a:spcPct val="112000"/>
+              </a:lnSpc>
+              <a:spcBef>
+                <a:spcPts val="1300"/>
+              </a:spcBef>
+              <a:buFont typeface="Arial" panose="020B0604020202020204" pitchFamily="34" charset="0"/>
+              <a:buNone/>
+              <a:defRPr sz="1600" b="1" i="1" kern="1200">
+                <a:solidFill>
+                  <a:schemeClr val="tx1">
+                    <a:lumMod val="85000"/>
+                    <a:lumOff val="15000"/>
+                  </a:schemeClr>
+                </a:solidFill>
+                <a:latin typeface="+mn-lt"/>
+                <a:ea typeface="+mn-ea"/>
+                <a:cs typeface="+mn-cs"/>
+              </a:defRPr>
+            </a:lvl7pPr>
+            <a:lvl8pPr marL="3200400" indent="0" algn="l" defTabSz="914400" rtl="0" eaLnBrk="1" latinLnBrk="0" hangingPunct="1">
+              <a:lnSpc>
+                <a:spcPct val="112000"/>
+              </a:lnSpc>
+              <a:spcBef>
+                <a:spcPts val="1300"/>
+              </a:spcBef>
+              <a:buFont typeface="Corbel" panose="020B0503020204020204" pitchFamily="34" charset="0"/>
+              <a:buNone/>
+              <a:defRPr sz="1600" b="1" kern="1200">
+                <a:solidFill>
+                  <a:schemeClr val="tx1">
+                    <a:lumMod val="85000"/>
+                    <a:lumOff val="15000"/>
+                  </a:schemeClr>
+                </a:solidFill>
+                <a:latin typeface="+mn-lt"/>
+                <a:ea typeface="+mn-ea"/>
+                <a:cs typeface="+mn-cs"/>
+              </a:defRPr>
+            </a:lvl8pPr>
+            <a:lvl9pPr marL="3657600" indent="0" algn="l" defTabSz="914400" rtl="0" eaLnBrk="1" latinLnBrk="0" hangingPunct="1">
+              <a:lnSpc>
+                <a:spcPct val="112000"/>
+              </a:lnSpc>
+              <a:spcBef>
+                <a:spcPts val="1300"/>
+              </a:spcBef>
+              <a:buFont typeface="Arial" panose="020B0604020202020204" pitchFamily="34" charset="0"/>
+              <a:buNone/>
+              <a:defRPr sz="1600" b="1" i="1" kern="1200" baseline="0">
+                <a:solidFill>
+                  <a:schemeClr val="tx1">
+                    <a:lumMod val="85000"/>
+                    <a:lumOff val="15000"/>
+                  </a:schemeClr>
+                </a:solidFill>
+                <a:latin typeface="+mn-lt"/>
+                <a:ea typeface="+mn-ea"/>
+                <a:cs typeface="+mn-cs"/>
+              </a:defRPr>
+            </a:lvl9pPr>
+          </a:lstStyle>
+          <a:p>
+            <a:r>
+              <a:rPr lang="pl-PL" dirty="0">
+                <a:solidFill>
+                  <a:schemeClr val="bg1"/>
+                </a:solidFill>
+                <a:latin typeface="Georgia" panose="02040502050405020303" pitchFamily="18" charset="0"/>
+              </a:rPr>
+              <a:t>Skeleton Recovery Algorithm</a:t>
+            </a:r>
+          </a:p>
+        </p:txBody>
+      </p:sp>
+      <p:pic>
+        <p:nvPicPr>
+          <p:cNvPr id="6" name="Picture 5">
+            <a:extLst>
+              <a:ext uri="{FF2B5EF4-FFF2-40B4-BE49-F238E27FC236}">
+                <a16:creationId xmlns:a16="http://schemas.microsoft.com/office/drawing/2014/main" id="{DAD7347C-D6CC-42F3-9D2A-0732D70D5BD1}"/>
+              </a:ext>
+            </a:extLst>
+          </p:cNvPr>
+          <p:cNvPicPr>
+            <a:picLocks noChangeAspect="1"/>
+          </p:cNvPicPr>
+          <p:nvPr/>
+        </p:nvPicPr>
+        <p:blipFill>
+          <a:blip r:embed="rId2">
+            <a:extLst>
+              <a:ext uri="{28A0092B-C50C-407E-A947-70E740481C1C}">
+                <a14:useLocalDpi xmlns:a14="http://schemas.microsoft.com/office/drawing/2010/main" val="0"/>
+              </a:ext>
+            </a:extLst>
+          </a:blip>
+          <a:stretch>
+            <a:fillRect/>
+          </a:stretch>
+        </p:blipFill>
+        <p:spPr>
+          <a:xfrm>
+            <a:off x="1427234" y="1282148"/>
+            <a:ext cx="7488166" cy="4716521"/>
+          </a:xfrm>
+          <a:prstGeom prst="rect">
+            <a:avLst/>
+          </a:prstGeom>
+        </p:spPr>
+      </p:pic>
+    </p:spTree>
+    <p:extLst>
+      <p:ext uri="{BB962C8B-B14F-4D97-AF65-F5344CB8AC3E}">
+        <p14:creationId xmlns:p14="http://schemas.microsoft.com/office/powerpoint/2010/main" val="2225343772"/>
+      </p:ext>
+    </p:extLst>
+  </p:cSld>
+  <p:clrMapOvr>
+    <a:masterClrMapping/>
+  </p:clrMapOvr>
+</p:sld>
+</file>
+
+<file path=ppt/slides/slide15.xml><?xml version="1.0" encoding="utf-8"?>
+<p:sld xmlns:a="http://schemas.openxmlformats.org/drawingml/2006/main" xmlns:r="http://schemas.openxmlformats.org/officeDocument/2006/relationships" xmlns:p="http://schemas.openxmlformats.org/presentationml/2006/main">
+  <p:cSld>
+    <p:bg>
+      <p:bgPr>
+        <a:solidFill>
+          <a:srgbClr val="1D1A1D"/>
+        </a:solidFill>
+        <a:effectLst/>
+      </p:bgPr>
+    </p:bg>
+    <p:spTree>
+      <p:nvGrpSpPr>
+        <p:cNvPr id="1" name=""/>
+        <p:cNvGrpSpPr/>
+        <p:nvPr/>
+      </p:nvGrpSpPr>
+      <p:grpSpPr>
+        <a:xfrm>
+          <a:off x="0" y="0"/>
+          <a:ext cx="0" cy="0"/>
+          <a:chOff x="0" y="0"/>
+          <a:chExt cx="0" cy="0"/>
+        </a:xfrm>
+      </p:grpSpPr>
+      <p:sp>
+        <p:nvSpPr>
+          <p:cNvPr id="15" name="Text Placeholder 6">
+            <a:extLst>
+              <a:ext uri="{FF2B5EF4-FFF2-40B4-BE49-F238E27FC236}">
+                <a16:creationId xmlns:a16="http://schemas.microsoft.com/office/drawing/2014/main" id="{5D2BAA3B-7146-4312-B82E-7B1A8C915C02}"/>
+              </a:ext>
+            </a:extLst>
+          </p:cNvPr>
+          <p:cNvSpPr txBox="1">
+            <a:spLocks/>
+          </p:cNvSpPr>
+          <p:nvPr/>
+        </p:nvSpPr>
+        <p:spPr>
+          <a:xfrm>
+            <a:off x="1947673" y="273160"/>
+            <a:ext cx="8401429" cy="819150"/>
+          </a:xfrm>
+          <a:prstGeom prst="rect">
+            <a:avLst/>
+          </a:prstGeom>
+        </p:spPr>
+        <p:txBody>
+          <a:bodyPr vert="horz" lIns="91440" tIns="45720" rIns="91440" bIns="45720" rtlCol="0" anchor="b">
+            <a:normAutofit/>
+          </a:bodyPr>
+          <a:lstStyle>
+            <a:lvl1pPr marL="0" indent="0" algn="l" defTabSz="914400" rtl="0" eaLnBrk="1" latinLnBrk="0" hangingPunct="1">
+              <a:lnSpc>
+                <a:spcPct val="113000"/>
+              </a:lnSpc>
+              <a:spcBef>
+                <a:spcPts val="0"/>
+              </a:spcBef>
+              <a:buFont typeface="Arial" panose="020B0604020202020204" pitchFamily="34" charset="0"/>
+              <a:buNone/>
+              <a:defRPr sz="2400" b="0" i="1" kern="1200" baseline="0">
+                <a:solidFill>
+                  <a:schemeClr val="tx1">
+                    <a:lumMod val="85000"/>
+                    <a:lumOff val="15000"/>
+                  </a:schemeClr>
+                </a:solidFill>
+                <a:latin typeface="+mn-lt"/>
+                <a:ea typeface="+mn-ea"/>
+                <a:cs typeface="+mn-cs"/>
+              </a:defRPr>
+            </a:lvl1pPr>
+            <a:lvl2pPr marL="457200" indent="0" algn="l" defTabSz="914400" rtl="0" eaLnBrk="1" latinLnBrk="0" hangingPunct="1">
+              <a:lnSpc>
+                <a:spcPct val="112000"/>
+              </a:lnSpc>
+              <a:spcBef>
+                <a:spcPts val="900"/>
+              </a:spcBef>
+              <a:buFont typeface="Corbel" panose="020B0503020204020204" pitchFamily="34" charset="0"/>
+              <a:buNone/>
+              <a:defRPr sz="2000" b="1" kern="1200" baseline="0">
+                <a:solidFill>
+                  <a:schemeClr val="tx1">
+                    <a:lumMod val="85000"/>
+                    <a:lumOff val="15000"/>
+                  </a:schemeClr>
+                </a:solidFill>
+                <a:latin typeface="+mn-lt"/>
+                <a:ea typeface="+mn-ea"/>
+                <a:cs typeface="+mn-cs"/>
+              </a:defRPr>
+            </a:lvl2pPr>
+            <a:lvl3pPr marL="914400" indent="0" algn="l" defTabSz="914400" rtl="0" eaLnBrk="1" latinLnBrk="0" hangingPunct="1">
+              <a:lnSpc>
+                <a:spcPct val="112000"/>
+              </a:lnSpc>
+              <a:spcBef>
+                <a:spcPts val="900"/>
+              </a:spcBef>
+              <a:buFont typeface="Arial" panose="020B0604020202020204" pitchFamily="34" charset="0"/>
+              <a:buNone/>
+              <a:defRPr sz="1800" b="1" kern="1200" baseline="0">
+                <a:solidFill>
+                  <a:schemeClr val="tx1">
+                    <a:lumMod val="85000"/>
+                    <a:lumOff val="15000"/>
+                  </a:schemeClr>
+                </a:solidFill>
+                <a:latin typeface="+mn-lt"/>
+                <a:ea typeface="+mn-ea"/>
+                <a:cs typeface="+mn-cs"/>
+              </a:defRPr>
+            </a:lvl3pPr>
+            <a:lvl4pPr marL="1371600" indent="0" algn="l" defTabSz="914400" rtl="0" eaLnBrk="1" latinLnBrk="0" hangingPunct="1">
+              <a:lnSpc>
+                <a:spcPct val="112000"/>
+              </a:lnSpc>
+              <a:spcBef>
+                <a:spcPts val="900"/>
+              </a:spcBef>
+              <a:buFont typeface="Corbel" panose="020B0503020204020204" pitchFamily="34" charset="0"/>
+              <a:buNone/>
+              <a:defRPr sz="1600" b="1" kern="1200" baseline="0">
+                <a:solidFill>
+                  <a:schemeClr val="tx1">
+                    <a:lumMod val="85000"/>
+                    <a:lumOff val="15000"/>
+                  </a:schemeClr>
+                </a:solidFill>
+                <a:latin typeface="+mn-lt"/>
+                <a:ea typeface="+mn-ea"/>
+                <a:cs typeface="+mn-cs"/>
+              </a:defRPr>
+            </a:lvl4pPr>
+            <a:lvl5pPr marL="1828800" indent="0" algn="l" defTabSz="914400" rtl="0" eaLnBrk="1" latinLnBrk="0" hangingPunct="1">
+              <a:lnSpc>
+                <a:spcPct val="112000"/>
+              </a:lnSpc>
+              <a:spcBef>
+                <a:spcPts val="900"/>
+              </a:spcBef>
+              <a:buFont typeface="Arial" panose="020B0604020202020204" pitchFamily="34" charset="0"/>
+              <a:buNone/>
+              <a:defRPr sz="1600" b="1" i="1" kern="1200" baseline="0">
+                <a:solidFill>
+                  <a:schemeClr val="tx1">
+                    <a:lumMod val="85000"/>
+                    <a:lumOff val="15000"/>
+                  </a:schemeClr>
+                </a:solidFill>
+                <a:latin typeface="+mn-lt"/>
+                <a:ea typeface="+mn-ea"/>
+                <a:cs typeface="+mn-cs"/>
+              </a:defRPr>
+            </a:lvl5pPr>
+            <a:lvl6pPr marL="2286000" indent="0" algn="l" defTabSz="914400" rtl="0" eaLnBrk="1" latinLnBrk="0" hangingPunct="1">
+              <a:lnSpc>
+                <a:spcPct val="112000"/>
+              </a:lnSpc>
+              <a:spcBef>
+                <a:spcPts val="1300"/>
+              </a:spcBef>
+              <a:buFont typeface="Corbel" panose="020B0503020204020204" pitchFamily="34" charset="0"/>
+              <a:buNone/>
+              <a:defRPr sz="1600" b="1" kern="1200">
+                <a:solidFill>
+                  <a:schemeClr val="tx1">
+                    <a:lumMod val="85000"/>
+                    <a:lumOff val="15000"/>
+                  </a:schemeClr>
+                </a:solidFill>
+                <a:latin typeface="+mn-lt"/>
+                <a:ea typeface="+mn-ea"/>
+                <a:cs typeface="+mn-cs"/>
+              </a:defRPr>
+            </a:lvl6pPr>
+            <a:lvl7pPr marL="2743200" indent="0" algn="l" defTabSz="914400" rtl="0" eaLnBrk="1" latinLnBrk="0" hangingPunct="1">
+              <a:lnSpc>
+                <a:spcPct val="112000"/>
+              </a:lnSpc>
+              <a:spcBef>
+                <a:spcPts val="1300"/>
+              </a:spcBef>
+              <a:buFont typeface="Arial" panose="020B0604020202020204" pitchFamily="34" charset="0"/>
+              <a:buNone/>
+              <a:defRPr sz="1600" b="1" i="1" kern="1200">
+                <a:solidFill>
+                  <a:schemeClr val="tx1">
+                    <a:lumMod val="85000"/>
+                    <a:lumOff val="15000"/>
+                  </a:schemeClr>
+                </a:solidFill>
+                <a:latin typeface="+mn-lt"/>
+                <a:ea typeface="+mn-ea"/>
+                <a:cs typeface="+mn-cs"/>
+              </a:defRPr>
+            </a:lvl7pPr>
+            <a:lvl8pPr marL="3200400" indent="0" algn="l" defTabSz="914400" rtl="0" eaLnBrk="1" latinLnBrk="0" hangingPunct="1">
+              <a:lnSpc>
+                <a:spcPct val="112000"/>
+              </a:lnSpc>
+              <a:spcBef>
+                <a:spcPts val="1300"/>
+              </a:spcBef>
+              <a:buFont typeface="Corbel" panose="020B0503020204020204" pitchFamily="34" charset="0"/>
+              <a:buNone/>
+              <a:defRPr sz="1600" b="1" kern="1200">
+                <a:solidFill>
+                  <a:schemeClr val="tx1">
+                    <a:lumMod val="85000"/>
+                    <a:lumOff val="15000"/>
+                  </a:schemeClr>
+                </a:solidFill>
+                <a:latin typeface="+mn-lt"/>
+                <a:ea typeface="+mn-ea"/>
+                <a:cs typeface="+mn-cs"/>
+              </a:defRPr>
+            </a:lvl8pPr>
+            <a:lvl9pPr marL="3657600" indent="0" algn="l" defTabSz="914400" rtl="0" eaLnBrk="1" latinLnBrk="0" hangingPunct="1">
+              <a:lnSpc>
+                <a:spcPct val="112000"/>
+              </a:lnSpc>
+              <a:spcBef>
+                <a:spcPts val="1300"/>
+              </a:spcBef>
+              <a:buFont typeface="Arial" panose="020B0604020202020204" pitchFamily="34" charset="0"/>
+              <a:buNone/>
+              <a:defRPr sz="1600" b="1" i="1" kern="1200" baseline="0">
+                <a:solidFill>
+                  <a:schemeClr val="tx1">
+                    <a:lumMod val="85000"/>
+                    <a:lumOff val="15000"/>
+                  </a:schemeClr>
+                </a:solidFill>
+                <a:latin typeface="+mn-lt"/>
+                <a:ea typeface="+mn-ea"/>
+                <a:cs typeface="+mn-cs"/>
+              </a:defRPr>
+            </a:lvl9pPr>
+          </a:lstStyle>
+          <a:p>
+            <a:r>
+              <a:rPr lang="pl-PL" dirty="0">
+                <a:solidFill>
+                  <a:schemeClr val="bg1"/>
+                </a:solidFill>
+                <a:latin typeface="Georgia" panose="02040502050405020303" pitchFamily="18" charset="0"/>
+              </a:rPr>
+              <a:t>Skeleton Recovery Algorithm</a:t>
+            </a:r>
+          </a:p>
+        </p:txBody>
+      </p:sp>
+      <p:pic>
+        <p:nvPicPr>
+          <p:cNvPr id="8" name="Picture 7">
+            <a:extLst>
+              <a:ext uri="{FF2B5EF4-FFF2-40B4-BE49-F238E27FC236}">
+                <a16:creationId xmlns:a16="http://schemas.microsoft.com/office/drawing/2014/main" id="{F94DC818-ACBB-46D6-9526-88C01B94B957}"/>
+              </a:ext>
+            </a:extLst>
+          </p:cNvPr>
+          <p:cNvPicPr>
+            <a:picLocks noChangeAspect="1"/>
+          </p:cNvPicPr>
+          <p:nvPr/>
+        </p:nvPicPr>
+        <p:blipFill>
+          <a:blip r:embed="rId2">
+            <a:extLst>
+              <a:ext uri="{28A0092B-C50C-407E-A947-70E740481C1C}">
+                <a14:useLocalDpi xmlns:a14="http://schemas.microsoft.com/office/drawing/2010/main" val="0"/>
+              </a:ext>
+            </a:extLst>
+          </a:blip>
+          <a:stretch>
+            <a:fillRect/>
+          </a:stretch>
+        </p:blipFill>
+        <p:spPr>
+          <a:xfrm>
+            <a:off x="1359845" y="1586988"/>
+            <a:ext cx="7600047" cy="3948397"/>
+          </a:xfrm>
+          <a:prstGeom prst="rect">
+            <a:avLst/>
+          </a:prstGeom>
+        </p:spPr>
+      </p:pic>
+    </p:spTree>
+    <p:extLst>
+      <p:ext uri="{BB962C8B-B14F-4D97-AF65-F5344CB8AC3E}">
+        <p14:creationId xmlns:p14="http://schemas.microsoft.com/office/powerpoint/2010/main" val="3971593173"/>
+      </p:ext>
+    </p:extLst>
+  </p:cSld>
+  <p:clrMapOvr>
+    <a:masterClrMapping/>
+  </p:clrMapOvr>
+</p:sld>
+</file>
+
+<file path=ppt/slides/slide16.xml><?xml version="1.0" encoding="utf-8"?>
+<p:sld xmlns:a="http://schemas.openxmlformats.org/drawingml/2006/main" xmlns:r="http://schemas.openxmlformats.org/officeDocument/2006/relationships" xmlns:p="http://schemas.openxmlformats.org/presentationml/2006/main">
+  <p:cSld>
+    <p:bg>
+      <p:bgPr>
+        <a:solidFill>
+          <a:srgbClr val="1D1A1D"/>
+        </a:solidFill>
+        <a:effectLst/>
+      </p:bgPr>
+    </p:bg>
+    <p:spTree>
+      <p:nvGrpSpPr>
+        <p:cNvPr id="1" name=""/>
+        <p:cNvGrpSpPr/>
+        <p:nvPr/>
+      </p:nvGrpSpPr>
+      <p:grpSpPr>
+        <a:xfrm>
+          <a:off x="0" y="0"/>
+          <a:ext cx="0" cy="0"/>
+          <a:chOff x="0" y="0"/>
+          <a:chExt cx="0" cy="0"/>
+        </a:xfrm>
+      </p:grpSpPr>
+      <p:sp>
+        <p:nvSpPr>
+          <p:cNvPr id="15" name="Text Placeholder 6">
+            <a:extLst>
+              <a:ext uri="{FF2B5EF4-FFF2-40B4-BE49-F238E27FC236}">
+                <a16:creationId xmlns:a16="http://schemas.microsoft.com/office/drawing/2014/main" id="{5D2BAA3B-7146-4312-B82E-7B1A8C915C02}"/>
+              </a:ext>
+            </a:extLst>
+          </p:cNvPr>
+          <p:cNvSpPr txBox="1">
+            <a:spLocks/>
+          </p:cNvSpPr>
+          <p:nvPr/>
+        </p:nvSpPr>
+        <p:spPr>
+          <a:xfrm>
+            <a:off x="1947673" y="273160"/>
+            <a:ext cx="8401429" cy="819150"/>
+          </a:xfrm>
+          <a:prstGeom prst="rect">
+            <a:avLst/>
+          </a:prstGeom>
+        </p:spPr>
+        <p:txBody>
+          <a:bodyPr vert="horz" lIns="91440" tIns="45720" rIns="91440" bIns="45720" rtlCol="0" anchor="b">
+            <a:normAutofit/>
+          </a:bodyPr>
+          <a:lstStyle>
+            <a:lvl1pPr marL="0" indent="0" algn="l" defTabSz="914400" rtl="0" eaLnBrk="1" latinLnBrk="0" hangingPunct="1">
+              <a:lnSpc>
+                <a:spcPct val="113000"/>
+              </a:lnSpc>
+              <a:spcBef>
+                <a:spcPts val="0"/>
+              </a:spcBef>
+              <a:buFont typeface="Arial" panose="020B0604020202020204" pitchFamily="34" charset="0"/>
+              <a:buNone/>
+              <a:defRPr sz="2400" b="0" i="1" kern="1200" baseline="0">
+                <a:solidFill>
+                  <a:schemeClr val="tx1">
+                    <a:lumMod val="85000"/>
+                    <a:lumOff val="15000"/>
+                  </a:schemeClr>
+                </a:solidFill>
+                <a:latin typeface="+mn-lt"/>
+                <a:ea typeface="+mn-ea"/>
+                <a:cs typeface="+mn-cs"/>
+              </a:defRPr>
+            </a:lvl1pPr>
+            <a:lvl2pPr marL="457200" indent="0" algn="l" defTabSz="914400" rtl="0" eaLnBrk="1" latinLnBrk="0" hangingPunct="1">
+              <a:lnSpc>
+                <a:spcPct val="112000"/>
+              </a:lnSpc>
+              <a:spcBef>
+                <a:spcPts val="900"/>
+              </a:spcBef>
+              <a:buFont typeface="Corbel" panose="020B0503020204020204" pitchFamily="34" charset="0"/>
+              <a:buNone/>
+              <a:defRPr sz="2000" b="1" kern="1200" baseline="0">
+                <a:solidFill>
+                  <a:schemeClr val="tx1">
+                    <a:lumMod val="85000"/>
+                    <a:lumOff val="15000"/>
+                  </a:schemeClr>
+                </a:solidFill>
+                <a:latin typeface="+mn-lt"/>
+                <a:ea typeface="+mn-ea"/>
+                <a:cs typeface="+mn-cs"/>
+              </a:defRPr>
+            </a:lvl2pPr>
+            <a:lvl3pPr marL="914400" indent="0" algn="l" defTabSz="914400" rtl="0" eaLnBrk="1" latinLnBrk="0" hangingPunct="1">
+              <a:lnSpc>
+                <a:spcPct val="112000"/>
+              </a:lnSpc>
+              <a:spcBef>
+                <a:spcPts val="900"/>
+              </a:spcBef>
+              <a:buFont typeface="Arial" panose="020B0604020202020204" pitchFamily="34" charset="0"/>
+              <a:buNone/>
+              <a:defRPr sz="1800" b="1" kern="1200" baseline="0">
+                <a:solidFill>
+                  <a:schemeClr val="tx1">
+                    <a:lumMod val="85000"/>
+                    <a:lumOff val="15000"/>
+                  </a:schemeClr>
+                </a:solidFill>
+                <a:latin typeface="+mn-lt"/>
+                <a:ea typeface="+mn-ea"/>
+                <a:cs typeface="+mn-cs"/>
+              </a:defRPr>
+            </a:lvl3pPr>
+            <a:lvl4pPr marL="1371600" indent="0" algn="l" defTabSz="914400" rtl="0" eaLnBrk="1" latinLnBrk="0" hangingPunct="1">
+              <a:lnSpc>
+                <a:spcPct val="112000"/>
+              </a:lnSpc>
+              <a:spcBef>
+                <a:spcPts val="900"/>
+              </a:spcBef>
+              <a:buFont typeface="Corbel" panose="020B0503020204020204" pitchFamily="34" charset="0"/>
+              <a:buNone/>
+              <a:defRPr sz="1600" b="1" kern="1200" baseline="0">
+                <a:solidFill>
+                  <a:schemeClr val="tx1">
+                    <a:lumMod val="85000"/>
+                    <a:lumOff val="15000"/>
+                  </a:schemeClr>
+                </a:solidFill>
+                <a:latin typeface="+mn-lt"/>
+                <a:ea typeface="+mn-ea"/>
+                <a:cs typeface="+mn-cs"/>
+              </a:defRPr>
+            </a:lvl4pPr>
+            <a:lvl5pPr marL="1828800" indent="0" algn="l" defTabSz="914400" rtl="0" eaLnBrk="1" latinLnBrk="0" hangingPunct="1">
+              <a:lnSpc>
+                <a:spcPct val="112000"/>
+              </a:lnSpc>
+              <a:spcBef>
+                <a:spcPts val="900"/>
+              </a:spcBef>
+              <a:buFont typeface="Arial" panose="020B0604020202020204" pitchFamily="34" charset="0"/>
+              <a:buNone/>
+              <a:defRPr sz="1600" b="1" i="1" kern="1200" baseline="0">
+                <a:solidFill>
+                  <a:schemeClr val="tx1">
+                    <a:lumMod val="85000"/>
+                    <a:lumOff val="15000"/>
+                  </a:schemeClr>
+                </a:solidFill>
+                <a:latin typeface="+mn-lt"/>
+                <a:ea typeface="+mn-ea"/>
+                <a:cs typeface="+mn-cs"/>
+              </a:defRPr>
+            </a:lvl5pPr>
+            <a:lvl6pPr marL="2286000" indent="0" algn="l" defTabSz="914400" rtl="0" eaLnBrk="1" latinLnBrk="0" hangingPunct="1">
+              <a:lnSpc>
+                <a:spcPct val="112000"/>
+              </a:lnSpc>
+              <a:spcBef>
+                <a:spcPts val="1300"/>
+              </a:spcBef>
+              <a:buFont typeface="Corbel" panose="020B0503020204020204" pitchFamily="34" charset="0"/>
+              <a:buNone/>
+              <a:defRPr sz="1600" b="1" kern="1200">
+                <a:solidFill>
+                  <a:schemeClr val="tx1">
+                    <a:lumMod val="85000"/>
+                    <a:lumOff val="15000"/>
+                  </a:schemeClr>
+                </a:solidFill>
+                <a:latin typeface="+mn-lt"/>
+                <a:ea typeface="+mn-ea"/>
+                <a:cs typeface="+mn-cs"/>
+              </a:defRPr>
+            </a:lvl6pPr>
+            <a:lvl7pPr marL="2743200" indent="0" algn="l" defTabSz="914400" rtl="0" eaLnBrk="1" latinLnBrk="0" hangingPunct="1">
+              <a:lnSpc>
+                <a:spcPct val="112000"/>
+              </a:lnSpc>
+              <a:spcBef>
+                <a:spcPts val="1300"/>
+              </a:spcBef>
+              <a:buFont typeface="Arial" panose="020B0604020202020204" pitchFamily="34" charset="0"/>
+              <a:buNone/>
+              <a:defRPr sz="1600" b="1" i="1" kern="1200">
+                <a:solidFill>
+                  <a:schemeClr val="tx1">
+                    <a:lumMod val="85000"/>
+                    <a:lumOff val="15000"/>
+                  </a:schemeClr>
+                </a:solidFill>
+                <a:latin typeface="+mn-lt"/>
+                <a:ea typeface="+mn-ea"/>
+                <a:cs typeface="+mn-cs"/>
+              </a:defRPr>
+            </a:lvl7pPr>
+            <a:lvl8pPr marL="3200400" indent="0" algn="l" defTabSz="914400" rtl="0" eaLnBrk="1" latinLnBrk="0" hangingPunct="1">
+              <a:lnSpc>
+                <a:spcPct val="112000"/>
+              </a:lnSpc>
+              <a:spcBef>
+                <a:spcPts val="1300"/>
+              </a:spcBef>
+              <a:buFont typeface="Corbel" panose="020B0503020204020204" pitchFamily="34" charset="0"/>
+              <a:buNone/>
+              <a:defRPr sz="1600" b="1" kern="1200">
+                <a:solidFill>
+                  <a:schemeClr val="tx1">
+                    <a:lumMod val="85000"/>
+                    <a:lumOff val="15000"/>
+                  </a:schemeClr>
+                </a:solidFill>
+                <a:latin typeface="+mn-lt"/>
+                <a:ea typeface="+mn-ea"/>
+                <a:cs typeface="+mn-cs"/>
+              </a:defRPr>
+            </a:lvl8pPr>
+            <a:lvl9pPr marL="3657600" indent="0" algn="l" defTabSz="914400" rtl="0" eaLnBrk="1" latinLnBrk="0" hangingPunct="1">
+              <a:lnSpc>
+                <a:spcPct val="112000"/>
+              </a:lnSpc>
+              <a:spcBef>
+                <a:spcPts val="1300"/>
+              </a:spcBef>
+              <a:buFont typeface="Arial" panose="020B0604020202020204" pitchFamily="34" charset="0"/>
+              <a:buNone/>
+              <a:defRPr sz="1600" b="1" i="1" kern="1200" baseline="0">
+                <a:solidFill>
+                  <a:schemeClr val="tx1">
+                    <a:lumMod val="85000"/>
+                    <a:lumOff val="15000"/>
+                  </a:schemeClr>
+                </a:solidFill>
+                <a:latin typeface="+mn-lt"/>
+                <a:ea typeface="+mn-ea"/>
+                <a:cs typeface="+mn-cs"/>
+              </a:defRPr>
+            </a:lvl9pPr>
+          </a:lstStyle>
+          <a:p>
+            <a:r>
+              <a:rPr lang="pl-PL" dirty="0">
+                <a:solidFill>
+                  <a:schemeClr val="bg1"/>
+                </a:solidFill>
+                <a:latin typeface="Georgia" panose="02040502050405020303" pitchFamily="18" charset="0"/>
+              </a:rPr>
+              <a:t>Complex Recovery</a:t>
+            </a:r>
+          </a:p>
+        </p:txBody>
+      </p:sp>
+      <p:pic>
+        <p:nvPicPr>
+          <p:cNvPr id="5" name="Picture 4">
+            <a:extLst>
+              <a:ext uri="{FF2B5EF4-FFF2-40B4-BE49-F238E27FC236}">
+                <a16:creationId xmlns:a16="http://schemas.microsoft.com/office/drawing/2014/main" id="{9F0230E7-F5AF-43B5-ACFA-4CDBF3274AF9}"/>
+              </a:ext>
+            </a:extLst>
+          </p:cNvPr>
+          <p:cNvPicPr>
+            <a:picLocks noChangeAspect="1"/>
+          </p:cNvPicPr>
+          <p:nvPr/>
+        </p:nvPicPr>
+        <p:blipFill>
+          <a:blip r:embed="rId2">
+            <a:extLst>
+              <a:ext uri="{28A0092B-C50C-407E-A947-70E740481C1C}">
+                <a14:useLocalDpi xmlns:a14="http://schemas.microsoft.com/office/drawing/2010/main" val="0"/>
+              </a:ext>
+            </a:extLst>
+          </a:blip>
+          <a:stretch>
+            <a:fillRect/>
+          </a:stretch>
+        </p:blipFill>
+        <p:spPr>
+          <a:xfrm>
+            <a:off x="966574" y="2034639"/>
+            <a:ext cx="9155746" cy="1394361"/>
+          </a:xfrm>
+          <a:prstGeom prst="rect">
+            <a:avLst/>
+          </a:prstGeom>
+        </p:spPr>
+      </p:pic>
+    </p:spTree>
+    <p:extLst>
+      <p:ext uri="{BB962C8B-B14F-4D97-AF65-F5344CB8AC3E}">
+        <p14:creationId xmlns:p14="http://schemas.microsoft.com/office/powerpoint/2010/main" val="2230344046"/>
+      </p:ext>
+    </p:extLst>
+  </p:cSld>
+  <p:clrMapOvr>
+    <a:masterClrMapping/>
+  </p:clrMapOvr>
+</p:sld>
+</file>
+
+<file path=ppt/slides/slide17.xml><?xml version="1.0" encoding="utf-8"?>
+<p:sld xmlns:a="http://schemas.openxmlformats.org/drawingml/2006/main" xmlns:r="http://schemas.openxmlformats.org/officeDocument/2006/relationships" xmlns:p="http://schemas.openxmlformats.org/presentationml/2006/main">
+  <p:cSld>
+    <p:bg>
+      <p:bgPr>
+        <a:solidFill>
+          <a:srgbClr val="1D1A1D"/>
+        </a:solidFill>
+        <a:effectLst/>
+      </p:bgPr>
+    </p:bg>
+    <p:spTree>
+      <p:nvGrpSpPr>
+        <p:cNvPr id="1" name=""/>
+        <p:cNvGrpSpPr/>
+        <p:nvPr/>
+      </p:nvGrpSpPr>
+      <p:grpSpPr>
+        <a:xfrm>
+          <a:off x="0" y="0"/>
+          <a:ext cx="0" cy="0"/>
+          <a:chOff x="0" y="0"/>
+          <a:chExt cx="0" cy="0"/>
+        </a:xfrm>
+      </p:grpSpPr>
+      <p:sp>
+        <p:nvSpPr>
+          <p:cNvPr id="15" name="Text Placeholder 6">
+            <a:extLst>
+              <a:ext uri="{FF2B5EF4-FFF2-40B4-BE49-F238E27FC236}">
+                <a16:creationId xmlns:a16="http://schemas.microsoft.com/office/drawing/2014/main" id="{5D2BAA3B-7146-4312-B82E-7B1A8C915C02}"/>
+              </a:ext>
+            </a:extLst>
+          </p:cNvPr>
+          <p:cNvSpPr txBox="1">
+            <a:spLocks/>
+          </p:cNvSpPr>
+          <p:nvPr/>
+        </p:nvSpPr>
+        <p:spPr>
+          <a:xfrm>
+            <a:off x="1947673" y="273160"/>
+            <a:ext cx="8401429" cy="819150"/>
+          </a:xfrm>
+          <a:prstGeom prst="rect">
+            <a:avLst/>
+          </a:prstGeom>
+        </p:spPr>
+        <p:txBody>
+          <a:bodyPr vert="horz" lIns="91440" tIns="45720" rIns="91440" bIns="45720" rtlCol="0" anchor="b">
+            <a:normAutofit/>
+          </a:bodyPr>
+          <a:lstStyle>
+            <a:lvl1pPr marL="0" indent="0" algn="l" defTabSz="914400" rtl="0" eaLnBrk="1" latinLnBrk="0" hangingPunct="1">
+              <a:lnSpc>
+                <a:spcPct val="113000"/>
+              </a:lnSpc>
+              <a:spcBef>
+                <a:spcPts val="0"/>
+              </a:spcBef>
+              <a:buFont typeface="Arial" panose="020B0604020202020204" pitchFamily="34" charset="0"/>
+              <a:buNone/>
+              <a:defRPr sz="2400" b="0" i="1" kern="1200" baseline="0">
+                <a:solidFill>
+                  <a:schemeClr val="tx1">
+                    <a:lumMod val="85000"/>
+                    <a:lumOff val="15000"/>
+                  </a:schemeClr>
+                </a:solidFill>
+                <a:latin typeface="+mn-lt"/>
+                <a:ea typeface="+mn-ea"/>
+                <a:cs typeface="+mn-cs"/>
+              </a:defRPr>
+            </a:lvl1pPr>
+            <a:lvl2pPr marL="457200" indent="0" algn="l" defTabSz="914400" rtl="0" eaLnBrk="1" latinLnBrk="0" hangingPunct="1">
+              <a:lnSpc>
+                <a:spcPct val="112000"/>
+              </a:lnSpc>
+              <a:spcBef>
+                <a:spcPts val="900"/>
+              </a:spcBef>
+              <a:buFont typeface="Corbel" panose="020B0503020204020204" pitchFamily="34" charset="0"/>
+              <a:buNone/>
+              <a:defRPr sz="2000" b="1" kern="1200" baseline="0">
+                <a:solidFill>
+                  <a:schemeClr val="tx1">
+                    <a:lumMod val="85000"/>
+                    <a:lumOff val="15000"/>
+                  </a:schemeClr>
+                </a:solidFill>
+                <a:latin typeface="+mn-lt"/>
+                <a:ea typeface="+mn-ea"/>
+                <a:cs typeface="+mn-cs"/>
+              </a:defRPr>
+            </a:lvl2pPr>
+            <a:lvl3pPr marL="914400" indent="0" algn="l" defTabSz="914400" rtl="0" eaLnBrk="1" latinLnBrk="0" hangingPunct="1">
+              <a:lnSpc>
+                <a:spcPct val="112000"/>
+              </a:lnSpc>
+              <a:spcBef>
+                <a:spcPts val="900"/>
+              </a:spcBef>
+              <a:buFont typeface="Arial" panose="020B0604020202020204" pitchFamily="34" charset="0"/>
+              <a:buNone/>
+              <a:defRPr sz="1800" b="1" kern="1200" baseline="0">
+                <a:solidFill>
+                  <a:schemeClr val="tx1">
+                    <a:lumMod val="85000"/>
+                    <a:lumOff val="15000"/>
+                  </a:schemeClr>
+                </a:solidFill>
+                <a:latin typeface="+mn-lt"/>
+                <a:ea typeface="+mn-ea"/>
+                <a:cs typeface="+mn-cs"/>
+              </a:defRPr>
+            </a:lvl3pPr>
+            <a:lvl4pPr marL="1371600" indent="0" algn="l" defTabSz="914400" rtl="0" eaLnBrk="1" latinLnBrk="0" hangingPunct="1">
+              <a:lnSpc>
+                <a:spcPct val="112000"/>
+              </a:lnSpc>
+              <a:spcBef>
+                <a:spcPts val="900"/>
+              </a:spcBef>
+              <a:buFont typeface="Corbel" panose="020B0503020204020204" pitchFamily="34" charset="0"/>
+              <a:buNone/>
+              <a:defRPr sz="1600" b="1" kern="1200" baseline="0">
+                <a:solidFill>
+                  <a:schemeClr val="tx1">
+                    <a:lumMod val="85000"/>
+                    <a:lumOff val="15000"/>
+                  </a:schemeClr>
+                </a:solidFill>
+                <a:latin typeface="+mn-lt"/>
+                <a:ea typeface="+mn-ea"/>
+                <a:cs typeface="+mn-cs"/>
+              </a:defRPr>
+            </a:lvl4pPr>
+            <a:lvl5pPr marL="1828800" indent="0" algn="l" defTabSz="914400" rtl="0" eaLnBrk="1" latinLnBrk="0" hangingPunct="1">
+              <a:lnSpc>
+                <a:spcPct val="112000"/>
+              </a:lnSpc>
+              <a:spcBef>
+                <a:spcPts val="900"/>
+              </a:spcBef>
+              <a:buFont typeface="Arial" panose="020B0604020202020204" pitchFamily="34" charset="0"/>
+              <a:buNone/>
+              <a:defRPr sz="1600" b="1" i="1" kern="1200" baseline="0">
+                <a:solidFill>
+                  <a:schemeClr val="tx1">
+                    <a:lumMod val="85000"/>
+                    <a:lumOff val="15000"/>
+                  </a:schemeClr>
+                </a:solidFill>
+                <a:latin typeface="+mn-lt"/>
+                <a:ea typeface="+mn-ea"/>
+                <a:cs typeface="+mn-cs"/>
+              </a:defRPr>
+            </a:lvl5pPr>
+            <a:lvl6pPr marL="2286000" indent="0" algn="l" defTabSz="914400" rtl="0" eaLnBrk="1" latinLnBrk="0" hangingPunct="1">
+              <a:lnSpc>
+                <a:spcPct val="112000"/>
+              </a:lnSpc>
+              <a:spcBef>
+                <a:spcPts val="1300"/>
+              </a:spcBef>
+              <a:buFont typeface="Corbel" panose="020B0503020204020204" pitchFamily="34" charset="0"/>
+              <a:buNone/>
+              <a:defRPr sz="1600" b="1" kern="1200">
+                <a:solidFill>
+                  <a:schemeClr val="tx1">
+                    <a:lumMod val="85000"/>
+                    <a:lumOff val="15000"/>
+                  </a:schemeClr>
+                </a:solidFill>
+                <a:latin typeface="+mn-lt"/>
+                <a:ea typeface="+mn-ea"/>
+                <a:cs typeface="+mn-cs"/>
+              </a:defRPr>
+            </a:lvl6pPr>
+            <a:lvl7pPr marL="2743200" indent="0" algn="l" defTabSz="914400" rtl="0" eaLnBrk="1" latinLnBrk="0" hangingPunct="1">
+              <a:lnSpc>
+                <a:spcPct val="112000"/>
+              </a:lnSpc>
+              <a:spcBef>
+                <a:spcPts val="1300"/>
+              </a:spcBef>
+              <a:buFont typeface="Arial" panose="020B0604020202020204" pitchFamily="34" charset="0"/>
+              <a:buNone/>
+              <a:defRPr sz="1600" b="1" i="1" kern="1200">
+                <a:solidFill>
+                  <a:schemeClr val="tx1">
+                    <a:lumMod val="85000"/>
+                    <a:lumOff val="15000"/>
+                  </a:schemeClr>
+                </a:solidFill>
+                <a:latin typeface="+mn-lt"/>
+                <a:ea typeface="+mn-ea"/>
+                <a:cs typeface="+mn-cs"/>
+              </a:defRPr>
+            </a:lvl7pPr>
+            <a:lvl8pPr marL="3200400" indent="0" algn="l" defTabSz="914400" rtl="0" eaLnBrk="1" latinLnBrk="0" hangingPunct="1">
+              <a:lnSpc>
+                <a:spcPct val="112000"/>
+              </a:lnSpc>
+              <a:spcBef>
+                <a:spcPts val="1300"/>
+              </a:spcBef>
+              <a:buFont typeface="Corbel" panose="020B0503020204020204" pitchFamily="34" charset="0"/>
+              <a:buNone/>
+              <a:defRPr sz="1600" b="1" kern="1200">
+                <a:solidFill>
+                  <a:schemeClr val="tx1">
+                    <a:lumMod val="85000"/>
+                    <a:lumOff val="15000"/>
+                  </a:schemeClr>
+                </a:solidFill>
+                <a:latin typeface="+mn-lt"/>
+                <a:ea typeface="+mn-ea"/>
+                <a:cs typeface="+mn-cs"/>
+              </a:defRPr>
+            </a:lvl8pPr>
+            <a:lvl9pPr marL="3657600" indent="0" algn="l" defTabSz="914400" rtl="0" eaLnBrk="1" latinLnBrk="0" hangingPunct="1">
+              <a:lnSpc>
+                <a:spcPct val="112000"/>
+              </a:lnSpc>
+              <a:spcBef>
+                <a:spcPts val="1300"/>
+              </a:spcBef>
+              <a:buFont typeface="Arial" panose="020B0604020202020204" pitchFamily="34" charset="0"/>
+              <a:buNone/>
+              <a:defRPr sz="1600" b="1" i="1" kern="1200" baseline="0">
+                <a:solidFill>
+                  <a:schemeClr val="tx1">
+                    <a:lumMod val="85000"/>
+                    <a:lumOff val="15000"/>
+                  </a:schemeClr>
+                </a:solidFill>
+                <a:latin typeface="+mn-lt"/>
+                <a:ea typeface="+mn-ea"/>
+                <a:cs typeface="+mn-cs"/>
+              </a:defRPr>
+            </a:lvl9pPr>
+          </a:lstStyle>
+          <a:p>
+            <a:r>
+              <a:rPr lang="pl-PL" dirty="0">
+                <a:solidFill>
+                  <a:schemeClr val="bg1"/>
+                </a:solidFill>
+                <a:latin typeface="Georgia" panose="02040502050405020303" pitchFamily="18" charset="0"/>
+              </a:rPr>
+              <a:t>Complex Recovery Algorithm</a:t>
+            </a:r>
+          </a:p>
+        </p:txBody>
+      </p:sp>
+      <p:pic>
+        <p:nvPicPr>
+          <p:cNvPr id="3" name="Picture 2">
+            <a:extLst>
+              <a:ext uri="{FF2B5EF4-FFF2-40B4-BE49-F238E27FC236}">
+                <a16:creationId xmlns:a16="http://schemas.microsoft.com/office/drawing/2014/main" id="{169BB55D-9938-41CA-8D78-2493A15466A4}"/>
+              </a:ext>
+            </a:extLst>
+          </p:cNvPr>
+          <p:cNvPicPr>
+            <a:picLocks noChangeAspect="1"/>
+          </p:cNvPicPr>
+          <p:nvPr/>
+        </p:nvPicPr>
+        <p:blipFill>
+          <a:blip r:embed="rId2">
+            <a:extLst>
+              <a:ext uri="{28A0092B-C50C-407E-A947-70E740481C1C}">
+                <a14:useLocalDpi xmlns:a14="http://schemas.microsoft.com/office/drawing/2010/main" val="0"/>
+              </a:ext>
+            </a:extLst>
+          </a:blip>
+          <a:stretch>
+            <a:fillRect/>
+          </a:stretch>
+        </p:blipFill>
+        <p:spPr>
+          <a:xfrm>
+            <a:off x="1065284" y="1244891"/>
+            <a:ext cx="8691038" cy="5339949"/>
+          </a:xfrm>
+          <a:prstGeom prst="rect">
+            <a:avLst/>
+          </a:prstGeom>
+        </p:spPr>
+      </p:pic>
+    </p:spTree>
+    <p:extLst>
+      <p:ext uri="{BB962C8B-B14F-4D97-AF65-F5344CB8AC3E}">
+        <p14:creationId xmlns:p14="http://schemas.microsoft.com/office/powerpoint/2010/main" val="3118097545"/>
+      </p:ext>
+    </p:extLst>
+  </p:cSld>
+  <p:clrMapOvr>
+    <a:masterClrMapping/>
+  </p:clrMapOvr>
+</p:sld>
+</file>
+
+<file path=ppt/slides/slide18.xml><?xml version="1.0" encoding="utf-8"?>
+<p:sld xmlns:a="http://schemas.openxmlformats.org/drawingml/2006/main" xmlns:r="http://schemas.openxmlformats.org/officeDocument/2006/relationships" xmlns:p="http://schemas.openxmlformats.org/presentationml/2006/main">
+  <p:cSld>
+    <p:bg>
+      <p:bgPr>
+        <a:solidFill>
+          <a:srgbClr val="1D1A1D"/>
+        </a:solidFill>
+        <a:effectLst/>
+      </p:bgPr>
+    </p:bg>
+    <p:spTree>
+      <p:nvGrpSpPr>
+        <p:cNvPr id="1" name=""/>
+        <p:cNvGrpSpPr/>
+        <p:nvPr/>
+      </p:nvGrpSpPr>
+      <p:grpSpPr>
+        <a:xfrm>
+          <a:off x="0" y="0"/>
+          <a:ext cx="0" cy="0"/>
+          <a:chOff x="0" y="0"/>
+          <a:chExt cx="0" cy="0"/>
+        </a:xfrm>
+      </p:grpSpPr>
+      <p:sp>
+        <p:nvSpPr>
+          <p:cNvPr id="15" name="Text Placeholder 6">
+            <a:extLst>
+              <a:ext uri="{FF2B5EF4-FFF2-40B4-BE49-F238E27FC236}">
+                <a16:creationId xmlns:a16="http://schemas.microsoft.com/office/drawing/2014/main" id="{5D2BAA3B-7146-4312-B82E-7B1A8C915C02}"/>
+              </a:ext>
+            </a:extLst>
+          </p:cNvPr>
+          <p:cNvSpPr txBox="1">
+            <a:spLocks/>
+          </p:cNvSpPr>
+          <p:nvPr/>
+        </p:nvSpPr>
+        <p:spPr>
+          <a:xfrm>
+            <a:off x="1947673" y="281324"/>
+            <a:ext cx="8401429" cy="819150"/>
+          </a:xfrm>
+          <a:prstGeom prst="rect">
+            <a:avLst/>
+          </a:prstGeom>
+        </p:spPr>
+        <p:txBody>
+          <a:bodyPr vert="horz" lIns="91440" tIns="45720" rIns="91440" bIns="45720" rtlCol="0" anchor="b">
+            <a:normAutofit/>
+          </a:bodyPr>
+          <a:lstStyle>
+            <a:lvl1pPr marL="0" indent="0" algn="l" defTabSz="914400" rtl="0" eaLnBrk="1" latinLnBrk="0" hangingPunct="1">
+              <a:lnSpc>
+                <a:spcPct val="113000"/>
+              </a:lnSpc>
+              <a:spcBef>
+                <a:spcPts val="0"/>
+              </a:spcBef>
+              <a:buFont typeface="Arial" panose="020B0604020202020204" pitchFamily="34" charset="0"/>
+              <a:buNone/>
+              <a:defRPr sz="2400" b="0" i="1" kern="1200" baseline="0">
+                <a:solidFill>
+                  <a:schemeClr val="tx1">
+                    <a:lumMod val="85000"/>
+                    <a:lumOff val="15000"/>
+                  </a:schemeClr>
+                </a:solidFill>
+                <a:latin typeface="+mn-lt"/>
+                <a:ea typeface="+mn-ea"/>
+                <a:cs typeface="+mn-cs"/>
+              </a:defRPr>
+            </a:lvl1pPr>
+            <a:lvl2pPr marL="457200" indent="0" algn="l" defTabSz="914400" rtl="0" eaLnBrk="1" latinLnBrk="0" hangingPunct="1">
+              <a:lnSpc>
+                <a:spcPct val="112000"/>
+              </a:lnSpc>
+              <a:spcBef>
+                <a:spcPts val="900"/>
+              </a:spcBef>
+              <a:buFont typeface="Corbel" panose="020B0503020204020204" pitchFamily="34" charset="0"/>
+              <a:buNone/>
+              <a:defRPr sz="2000" b="1" kern="1200" baseline="0">
+                <a:solidFill>
+                  <a:schemeClr val="tx1">
+                    <a:lumMod val="85000"/>
+                    <a:lumOff val="15000"/>
+                  </a:schemeClr>
+                </a:solidFill>
+                <a:latin typeface="+mn-lt"/>
+                <a:ea typeface="+mn-ea"/>
+                <a:cs typeface="+mn-cs"/>
+              </a:defRPr>
+            </a:lvl2pPr>
+            <a:lvl3pPr marL="914400" indent="0" algn="l" defTabSz="914400" rtl="0" eaLnBrk="1" latinLnBrk="0" hangingPunct="1">
+              <a:lnSpc>
+                <a:spcPct val="112000"/>
+              </a:lnSpc>
+              <a:spcBef>
+                <a:spcPts val="900"/>
+              </a:spcBef>
+              <a:buFont typeface="Arial" panose="020B0604020202020204" pitchFamily="34" charset="0"/>
+              <a:buNone/>
+              <a:defRPr sz="1800" b="1" kern="1200" baseline="0">
+                <a:solidFill>
+                  <a:schemeClr val="tx1">
+                    <a:lumMod val="85000"/>
+                    <a:lumOff val="15000"/>
+                  </a:schemeClr>
+                </a:solidFill>
+                <a:latin typeface="+mn-lt"/>
+                <a:ea typeface="+mn-ea"/>
+                <a:cs typeface="+mn-cs"/>
+              </a:defRPr>
+            </a:lvl3pPr>
+            <a:lvl4pPr marL="1371600" indent="0" algn="l" defTabSz="914400" rtl="0" eaLnBrk="1" latinLnBrk="0" hangingPunct="1">
+              <a:lnSpc>
+                <a:spcPct val="112000"/>
+              </a:lnSpc>
+              <a:spcBef>
+                <a:spcPts val="900"/>
+              </a:spcBef>
+              <a:buFont typeface="Corbel" panose="020B0503020204020204" pitchFamily="34" charset="0"/>
+              <a:buNone/>
+              <a:defRPr sz="1600" b="1" kern="1200" baseline="0">
+                <a:solidFill>
+                  <a:schemeClr val="tx1">
+                    <a:lumMod val="85000"/>
+                    <a:lumOff val="15000"/>
+                  </a:schemeClr>
+                </a:solidFill>
+                <a:latin typeface="+mn-lt"/>
+                <a:ea typeface="+mn-ea"/>
+                <a:cs typeface="+mn-cs"/>
+              </a:defRPr>
+            </a:lvl4pPr>
+            <a:lvl5pPr marL="1828800" indent="0" algn="l" defTabSz="914400" rtl="0" eaLnBrk="1" latinLnBrk="0" hangingPunct="1">
+              <a:lnSpc>
+                <a:spcPct val="112000"/>
+              </a:lnSpc>
+              <a:spcBef>
+                <a:spcPts val="900"/>
+              </a:spcBef>
+              <a:buFont typeface="Arial" panose="020B0604020202020204" pitchFamily="34" charset="0"/>
+              <a:buNone/>
+              <a:defRPr sz="1600" b="1" i="1" kern="1200" baseline="0">
+                <a:solidFill>
+                  <a:schemeClr val="tx1">
+                    <a:lumMod val="85000"/>
+                    <a:lumOff val="15000"/>
+                  </a:schemeClr>
+                </a:solidFill>
+                <a:latin typeface="+mn-lt"/>
+                <a:ea typeface="+mn-ea"/>
+                <a:cs typeface="+mn-cs"/>
+              </a:defRPr>
+            </a:lvl5pPr>
+            <a:lvl6pPr marL="2286000" indent="0" algn="l" defTabSz="914400" rtl="0" eaLnBrk="1" latinLnBrk="0" hangingPunct="1">
+              <a:lnSpc>
+                <a:spcPct val="112000"/>
+              </a:lnSpc>
+              <a:spcBef>
+                <a:spcPts val="1300"/>
+              </a:spcBef>
+              <a:buFont typeface="Corbel" panose="020B0503020204020204" pitchFamily="34" charset="0"/>
+              <a:buNone/>
+              <a:defRPr sz="1600" b="1" kern="1200">
+                <a:solidFill>
+                  <a:schemeClr val="tx1">
+                    <a:lumMod val="85000"/>
+                    <a:lumOff val="15000"/>
+                  </a:schemeClr>
+                </a:solidFill>
+                <a:latin typeface="+mn-lt"/>
+                <a:ea typeface="+mn-ea"/>
+                <a:cs typeface="+mn-cs"/>
+              </a:defRPr>
+            </a:lvl6pPr>
+            <a:lvl7pPr marL="2743200" indent="0" algn="l" defTabSz="914400" rtl="0" eaLnBrk="1" latinLnBrk="0" hangingPunct="1">
+              <a:lnSpc>
+                <a:spcPct val="112000"/>
+              </a:lnSpc>
+              <a:spcBef>
+                <a:spcPts val="1300"/>
+              </a:spcBef>
+              <a:buFont typeface="Arial" panose="020B0604020202020204" pitchFamily="34" charset="0"/>
+              <a:buNone/>
+              <a:defRPr sz="1600" b="1" i="1" kern="1200">
+                <a:solidFill>
+                  <a:schemeClr val="tx1">
+                    <a:lumMod val="85000"/>
+                    <a:lumOff val="15000"/>
+                  </a:schemeClr>
+                </a:solidFill>
+                <a:latin typeface="+mn-lt"/>
+                <a:ea typeface="+mn-ea"/>
+                <a:cs typeface="+mn-cs"/>
+              </a:defRPr>
+            </a:lvl7pPr>
+            <a:lvl8pPr marL="3200400" indent="0" algn="l" defTabSz="914400" rtl="0" eaLnBrk="1" latinLnBrk="0" hangingPunct="1">
+              <a:lnSpc>
+                <a:spcPct val="112000"/>
+              </a:lnSpc>
+              <a:spcBef>
+                <a:spcPts val="1300"/>
+              </a:spcBef>
+              <a:buFont typeface="Corbel" panose="020B0503020204020204" pitchFamily="34" charset="0"/>
+              <a:buNone/>
+              <a:defRPr sz="1600" b="1" kern="1200">
+                <a:solidFill>
+                  <a:schemeClr val="tx1">
+                    <a:lumMod val="85000"/>
+                    <a:lumOff val="15000"/>
+                  </a:schemeClr>
+                </a:solidFill>
+                <a:latin typeface="+mn-lt"/>
+                <a:ea typeface="+mn-ea"/>
+                <a:cs typeface="+mn-cs"/>
+              </a:defRPr>
+            </a:lvl8pPr>
+            <a:lvl9pPr marL="3657600" indent="0" algn="l" defTabSz="914400" rtl="0" eaLnBrk="1" latinLnBrk="0" hangingPunct="1">
+              <a:lnSpc>
+                <a:spcPct val="112000"/>
+              </a:lnSpc>
+              <a:spcBef>
+                <a:spcPts val="1300"/>
+              </a:spcBef>
+              <a:buFont typeface="Arial" panose="020B0604020202020204" pitchFamily="34" charset="0"/>
+              <a:buNone/>
+              <a:defRPr sz="1600" b="1" i="1" kern="1200" baseline="0">
+                <a:solidFill>
+                  <a:schemeClr val="tx1">
+                    <a:lumMod val="85000"/>
+                    <a:lumOff val="15000"/>
+                  </a:schemeClr>
+                </a:solidFill>
+                <a:latin typeface="+mn-lt"/>
+                <a:ea typeface="+mn-ea"/>
+                <a:cs typeface="+mn-cs"/>
+              </a:defRPr>
+            </a:lvl9pPr>
+          </a:lstStyle>
+          <a:p>
+            <a:r>
+              <a:rPr lang="pl-PL" dirty="0">
+                <a:solidFill>
+                  <a:schemeClr val="bg1"/>
+                </a:solidFill>
+                <a:latin typeface="Georgia" panose="02040502050405020303" pitchFamily="18" charset="0"/>
+              </a:rPr>
+              <a:t>Testing conditional independence</a:t>
+            </a:r>
+          </a:p>
+        </p:txBody>
+      </p:sp>
+      <p:pic>
+        <p:nvPicPr>
+          <p:cNvPr id="4" name="Picture 3">
+            <a:extLst>
+              <a:ext uri="{FF2B5EF4-FFF2-40B4-BE49-F238E27FC236}">
+                <a16:creationId xmlns:a16="http://schemas.microsoft.com/office/drawing/2014/main" id="{9F1C29AF-877F-4263-9AED-5783C1501CBE}"/>
+              </a:ext>
+            </a:extLst>
+          </p:cNvPr>
+          <p:cNvPicPr>
+            <a:picLocks noChangeAspect="1"/>
+          </p:cNvPicPr>
+          <p:nvPr/>
+        </p:nvPicPr>
+        <p:blipFill>
+          <a:blip r:embed="rId2">
+            <a:extLst>
+              <a:ext uri="{28A0092B-C50C-407E-A947-70E740481C1C}">
+                <a14:useLocalDpi xmlns:a14="http://schemas.microsoft.com/office/drawing/2010/main" val="0"/>
+              </a:ext>
+            </a:extLst>
+          </a:blip>
+          <a:stretch>
+            <a:fillRect/>
+          </a:stretch>
+        </p:blipFill>
+        <p:spPr>
+          <a:xfrm>
+            <a:off x="1947673" y="1340215"/>
+            <a:ext cx="7162485" cy="4519687"/>
+          </a:xfrm>
+          <a:prstGeom prst="rect">
+            <a:avLst/>
+          </a:prstGeom>
+        </p:spPr>
+      </p:pic>
+    </p:spTree>
+    <p:extLst>
+      <p:ext uri="{BB962C8B-B14F-4D97-AF65-F5344CB8AC3E}">
+        <p14:creationId xmlns:p14="http://schemas.microsoft.com/office/powerpoint/2010/main" val="3970270457"/>
+      </p:ext>
+    </p:extLst>
+  </p:cSld>
+  <p:clrMapOvr>
+    <a:masterClrMapping/>
+  </p:clrMapOvr>
+</p:sld>
+</file>
+
+<file path=ppt/slides/slide19.xml><?xml version="1.0" encoding="utf-8"?>
+<p:sld xmlns:a="http://schemas.openxmlformats.org/drawingml/2006/main" xmlns:r="http://schemas.openxmlformats.org/officeDocument/2006/relationships" xmlns:p="http://schemas.openxmlformats.org/presentationml/2006/main">
+  <p:cSld>
+    <p:bg>
+      <p:bgPr>
+        <a:solidFill>
+          <a:srgbClr val="1D1A1D"/>
+        </a:solidFill>
+        <a:effectLst/>
+      </p:bgPr>
+    </p:bg>
+    <p:spTree>
+      <p:nvGrpSpPr>
+        <p:cNvPr id="1" name=""/>
+        <p:cNvGrpSpPr/>
+        <p:nvPr/>
+      </p:nvGrpSpPr>
+      <p:grpSpPr>
+        <a:xfrm>
+          <a:off x="0" y="0"/>
+          <a:ext cx="0" cy="0"/>
+          <a:chOff x="0" y="0"/>
+          <a:chExt cx="0" cy="0"/>
+        </a:xfrm>
+      </p:grpSpPr>
+      <p:sp>
+        <p:nvSpPr>
+          <p:cNvPr id="15" name="Text Placeholder 6">
+            <a:extLst>
+              <a:ext uri="{FF2B5EF4-FFF2-40B4-BE49-F238E27FC236}">
+                <a16:creationId xmlns:a16="http://schemas.microsoft.com/office/drawing/2014/main" id="{5D2BAA3B-7146-4312-B82E-7B1A8C915C02}"/>
+              </a:ext>
+            </a:extLst>
+          </p:cNvPr>
+          <p:cNvSpPr txBox="1">
+            <a:spLocks/>
+          </p:cNvSpPr>
+          <p:nvPr/>
+        </p:nvSpPr>
+        <p:spPr>
+          <a:xfrm>
+            <a:off x="1947673" y="281324"/>
+            <a:ext cx="8401429" cy="819150"/>
+          </a:xfrm>
+          <a:prstGeom prst="rect">
+            <a:avLst/>
+          </a:prstGeom>
+        </p:spPr>
+        <p:txBody>
+          <a:bodyPr vert="horz" lIns="91440" tIns="45720" rIns="91440" bIns="45720" rtlCol="0" anchor="b">
+            <a:normAutofit/>
+          </a:bodyPr>
+          <a:lstStyle>
+            <a:lvl1pPr marL="0" indent="0" algn="l" defTabSz="914400" rtl="0" eaLnBrk="1" latinLnBrk="0" hangingPunct="1">
+              <a:lnSpc>
+                <a:spcPct val="113000"/>
+              </a:lnSpc>
+              <a:spcBef>
+                <a:spcPts val="0"/>
+              </a:spcBef>
+              <a:buFont typeface="Arial" panose="020B0604020202020204" pitchFamily="34" charset="0"/>
+              <a:buNone/>
+              <a:defRPr sz="2400" b="0" i="1" kern="1200" baseline="0">
+                <a:solidFill>
+                  <a:schemeClr val="tx1">
+                    <a:lumMod val="85000"/>
+                    <a:lumOff val="15000"/>
+                  </a:schemeClr>
+                </a:solidFill>
+                <a:latin typeface="+mn-lt"/>
+                <a:ea typeface="+mn-ea"/>
+                <a:cs typeface="+mn-cs"/>
+              </a:defRPr>
+            </a:lvl1pPr>
+            <a:lvl2pPr marL="457200" indent="0" algn="l" defTabSz="914400" rtl="0" eaLnBrk="1" latinLnBrk="0" hangingPunct="1">
+              <a:lnSpc>
+                <a:spcPct val="112000"/>
+              </a:lnSpc>
+              <a:spcBef>
+                <a:spcPts val="900"/>
+              </a:spcBef>
+              <a:buFont typeface="Corbel" panose="020B0503020204020204" pitchFamily="34" charset="0"/>
+              <a:buNone/>
+              <a:defRPr sz="2000" b="1" kern="1200" baseline="0">
+                <a:solidFill>
+                  <a:schemeClr val="tx1">
+                    <a:lumMod val="85000"/>
+                    <a:lumOff val="15000"/>
+                  </a:schemeClr>
+                </a:solidFill>
+                <a:latin typeface="+mn-lt"/>
+                <a:ea typeface="+mn-ea"/>
+                <a:cs typeface="+mn-cs"/>
+              </a:defRPr>
+            </a:lvl2pPr>
+            <a:lvl3pPr marL="914400" indent="0" algn="l" defTabSz="914400" rtl="0" eaLnBrk="1" latinLnBrk="0" hangingPunct="1">
+              <a:lnSpc>
+                <a:spcPct val="112000"/>
+              </a:lnSpc>
+              <a:spcBef>
+                <a:spcPts val="900"/>
+              </a:spcBef>
+              <a:buFont typeface="Arial" panose="020B0604020202020204" pitchFamily="34" charset="0"/>
+              <a:buNone/>
+              <a:defRPr sz="1800" b="1" kern="1200" baseline="0">
+                <a:solidFill>
+                  <a:schemeClr val="tx1">
+                    <a:lumMod val="85000"/>
+                    <a:lumOff val="15000"/>
+                  </a:schemeClr>
+                </a:solidFill>
+                <a:latin typeface="+mn-lt"/>
+                <a:ea typeface="+mn-ea"/>
+                <a:cs typeface="+mn-cs"/>
+              </a:defRPr>
+            </a:lvl3pPr>
+            <a:lvl4pPr marL="1371600" indent="0" algn="l" defTabSz="914400" rtl="0" eaLnBrk="1" latinLnBrk="0" hangingPunct="1">
+              <a:lnSpc>
+                <a:spcPct val="112000"/>
+              </a:lnSpc>
+              <a:spcBef>
+                <a:spcPts val="900"/>
+              </a:spcBef>
+              <a:buFont typeface="Corbel" panose="020B0503020204020204" pitchFamily="34" charset="0"/>
+              <a:buNone/>
+              <a:defRPr sz="1600" b="1" kern="1200" baseline="0">
+                <a:solidFill>
+                  <a:schemeClr val="tx1">
+                    <a:lumMod val="85000"/>
+                    <a:lumOff val="15000"/>
+                  </a:schemeClr>
+                </a:solidFill>
+                <a:latin typeface="+mn-lt"/>
+                <a:ea typeface="+mn-ea"/>
+                <a:cs typeface="+mn-cs"/>
+              </a:defRPr>
+            </a:lvl4pPr>
+            <a:lvl5pPr marL="1828800" indent="0" algn="l" defTabSz="914400" rtl="0" eaLnBrk="1" latinLnBrk="0" hangingPunct="1">
+              <a:lnSpc>
+                <a:spcPct val="112000"/>
+              </a:lnSpc>
+              <a:spcBef>
+                <a:spcPts val="900"/>
+              </a:spcBef>
+              <a:buFont typeface="Arial" panose="020B0604020202020204" pitchFamily="34" charset="0"/>
+              <a:buNone/>
+              <a:defRPr sz="1600" b="1" i="1" kern="1200" baseline="0">
+                <a:solidFill>
+                  <a:schemeClr val="tx1">
+                    <a:lumMod val="85000"/>
+                    <a:lumOff val="15000"/>
+                  </a:schemeClr>
+                </a:solidFill>
+                <a:latin typeface="+mn-lt"/>
+                <a:ea typeface="+mn-ea"/>
+                <a:cs typeface="+mn-cs"/>
+              </a:defRPr>
+            </a:lvl5pPr>
+            <a:lvl6pPr marL="2286000" indent="0" algn="l" defTabSz="914400" rtl="0" eaLnBrk="1" latinLnBrk="0" hangingPunct="1">
+              <a:lnSpc>
+                <a:spcPct val="112000"/>
+              </a:lnSpc>
+              <a:spcBef>
+                <a:spcPts val="1300"/>
+              </a:spcBef>
+              <a:buFont typeface="Corbel" panose="020B0503020204020204" pitchFamily="34" charset="0"/>
+              <a:buNone/>
+              <a:defRPr sz="1600" b="1" kern="1200">
+                <a:solidFill>
+                  <a:schemeClr val="tx1">
+                    <a:lumMod val="85000"/>
+                    <a:lumOff val="15000"/>
+                  </a:schemeClr>
+                </a:solidFill>
+                <a:latin typeface="+mn-lt"/>
+                <a:ea typeface="+mn-ea"/>
+                <a:cs typeface="+mn-cs"/>
+              </a:defRPr>
+            </a:lvl6pPr>
+            <a:lvl7pPr marL="2743200" indent="0" algn="l" defTabSz="914400" rtl="0" eaLnBrk="1" latinLnBrk="0" hangingPunct="1">
+              <a:lnSpc>
+                <a:spcPct val="112000"/>
+              </a:lnSpc>
+              <a:spcBef>
+                <a:spcPts val="1300"/>
+              </a:spcBef>
+              <a:buFont typeface="Arial" panose="020B0604020202020204" pitchFamily="34" charset="0"/>
+              <a:buNone/>
+              <a:defRPr sz="1600" b="1" i="1" kern="1200">
+                <a:solidFill>
+                  <a:schemeClr val="tx1">
+                    <a:lumMod val="85000"/>
+                    <a:lumOff val="15000"/>
+                  </a:schemeClr>
+                </a:solidFill>
+                <a:latin typeface="+mn-lt"/>
+                <a:ea typeface="+mn-ea"/>
+                <a:cs typeface="+mn-cs"/>
+              </a:defRPr>
+            </a:lvl7pPr>
+            <a:lvl8pPr marL="3200400" indent="0" algn="l" defTabSz="914400" rtl="0" eaLnBrk="1" latinLnBrk="0" hangingPunct="1">
+              <a:lnSpc>
+                <a:spcPct val="112000"/>
+              </a:lnSpc>
+              <a:spcBef>
+                <a:spcPts val="1300"/>
+              </a:spcBef>
+              <a:buFont typeface="Corbel" panose="020B0503020204020204" pitchFamily="34" charset="0"/>
+              <a:buNone/>
+              <a:defRPr sz="1600" b="1" kern="1200">
+                <a:solidFill>
+                  <a:schemeClr val="tx1">
+                    <a:lumMod val="85000"/>
+                    <a:lumOff val="15000"/>
+                  </a:schemeClr>
+                </a:solidFill>
+                <a:latin typeface="+mn-lt"/>
+                <a:ea typeface="+mn-ea"/>
+                <a:cs typeface="+mn-cs"/>
+              </a:defRPr>
+            </a:lvl8pPr>
+            <a:lvl9pPr marL="3657600" indent="0" algn="l" defTabSz="914400" rtl="0" eaLnBrk="1" latinLnBrk="0" hangingPunct="1">
+              <a:lnSpc>
+                <a:spcPct val="112000"/>
+              </a:lnSpc>
+              <a:spcBef>
+                <a:spcPts val="1300"/>
+              </a:spcBef>
+              <a:buFont typeface="Arial" panose="020B0604020202020204" pitchFamily="34" charset="0"/>
+              <a:buNone/>
+              <a:defRPr sz="1600" b="1" i="1" kern="1200" baseline="0">
+                <a:solidFill>
+                  <a:schemeClr val="tx1">
+                    <a:lumMod val="85000"/>
+                    <a:lumOff val="15000"/>
+                  </a:schemeClr>
+                </a:solidFill>
+                <a:latin typeface="+mn-lt"/>
+                <a:ea typeface="+mn-ea"/>
+                <a:cs typeface="+mn-cs"/>
+              </a:defRPr>
+            </a:lvl9pPr>
+          </a:lstStyle>
+          <a:p>
+            <a:r>
+              <a:rPr lang="pl-PL" dirty="0">
+                <a:solidFill>
+                  <a:schemeClr val="bg1"/>
+                </a:solidFill>
+                <a:latin typeface="Georgia" panose="02040502050405020303" pitchFamily="18" charset="0"/>
+              </a:rPr>
+              <a:t>Testing conditional independence</a:t>
+            </a:r>
+          </a:p>
+        </p:txBody>
+      </p:sp>
+      <p:pic>
+        <p:nvPicPr>
+          <p:cNvPr id="6" name="Picture 5">
+            <a:extLst>
+              <a:ext uri="{FF2B5EF4-FFF2-40B4-BE49-F238E27FC236}">
+                <a16:creationId xmlns:a16="http://schemas.microsoft.com/office/drawing/2014/main" id="{F23F1FFA-140E-4BB4-A19A-874A385E49EF}"/>
+              </a:ext>
+            </a:extLst>
+          </p:cNvPr>
+          <p:cNvPicPr>
+            <a:picLocks noChangeAspect="1"/>
+          </p:cNvPicPr>
+          <p:nvPr/>
+        </p:nvPicPr>
+        <p:blipFill>
+          <a:blip r:embed="rId2">
+            <a:extLst>
+              <a:ext uri="{28A0092B-C50C-407E-A947-70E740481C1C}">
+                <a14:useLocalDpi xmlns:a14="http://schemas.microsoft.com/office/drawing/2010/main" val="0"/>
+              </a:ext>
+            </a:extLst>
+          </a:blip>
+          <a:stretch>
+            <a:fillRect/>
+          </a:stretch>
+        </p:blipFill>
+        <p:spPr>
+          <a:xfrm>
+            <a:off x="1110250" y="1930791"/>
+            <a:ext cx="10080450" cy="2557447"/>
+          </a:xfrm>
+          <a:prstGeom prst="rect">
+            <a:avLst/>
+          </a:prstGeom>
+        </p:spPr>
+      </p:pic>
+    </p:spTree>
+    <p:extLst>
+      <p:ext uri="{BB962C8B-B14F-4D97-AF65-F5344CB8AC3E}">
+        <p14:creationId xmlns:p14="http://schemas.microsoft.com/office/powerpoint/2010/main" val="2720237382"/>
+      </p:ext>
+    </p:extLst>
+  </p:cSld>
+  <p:clrMapOvr>
+    <a:masterClrMapping/>
+  </p:clrMapOvr>
+</p:sld>
+</file>
+
 <file path=ppt/slides/slide2.xml><?xml version="1.0" encoding="utf-8"?>
 <p:sld xmlns:a="http://schemas.openxmlformats.org/drawingml/2006/main" xmlns:r="http://schemas.openxmlformats.org/officeDocument/2006/relationships" xmlns:p="http://schemas.openxmlformats.org/presentationml/2006/main">
   <p:cSld>

</xml_diff>